<commit_message>
2D splitter DNN update
</commit_message>
<xml_diff>
--- a/랩미팅/201906/190624 Machine Learning splitter (Jong).pptx
+++ b/랩미팅/201906/190624 Machine Learning splitter (Jong).pptx
@@ -5,14 +5,13 @@
     <p:sldMasterId id="2147483660" r:id="rId1"/>
   </p:sldMasterIdLst>
   <p:notesMasterIdLst>
-    <p:notesMasterId r:id="rId7"/>
+    <p:notesMasterId r:id="rId6"/>
   </p:notesMasterIdLst>
   <p:sldIdLst>
     <p:sldId id="322" r:id="rId2"/>
     <p:sldId id="325" r:id="rId3"/>
     <p:sldId id="329" r:id="rId4"/>
     <p:sldId id="327" r:id="rId5"/>
-    <p:sldId id="328" r:id="rId6"/>
   </p:sldIdLst>
   <p:sldSz cx="9144000" cy="6858000" type="screen4x3"/>
   <p:notesSz cx="6735763" cy="9866313"/>
@@ -201,7 +200,7 @@
           <a:p>
             <a:fld id="{A9D6DECA-6E4E-4D09-9277-E151A2E3F74C}" type="datetimeFigureOut">
               <a:rPr lang="ko-KR" altLang="en-US" smtClean="0"/>
-              <a:t>2019-06-21</a:t>
+              <a:t>2019-06-24</a:t>
             </a:fld>
             <a:endParaRPr lang="ko-KR" altLang="en-US"/>
           </a:p>
@@ -768,7 +767,7 @@
           <a:p>
             <a:fld id="{78E89258-A40F-4400-BA1A-638141289729}" type="datetime1">
               <a:rPr lang="ko-KR" altLang="en-US" smtClean="0"/>
-              <a:t>2019-06-21</a:t>
+              <a:t>2019-06-24</a:t>
             </a:fld>
             <a:endParaRPr lang="ko-KR" altLang="en-US"/>
           </a:p>
@@ -945,7 +944,7 @@
           <a:p>
             <a:fld id="{CD116CEF-802E-43F7-8932-78519DF2A264}" type="datetime1">
               <a:rPr lang="ko-KR" altLang="en-US" smtClean="0"/>
-              <a:t>2019-06-21</a:t>
+              <a:t>2019-06-24</a:t>
             </a:fld>
             <a:endParaRPr lang="ko-KR" altLang="en-US"/>
           </a:p>
@@ -1125,7 +1124,7 @@
           <a:p>
             <a:fld id="{EFD9D7C3-1982-427D-BFA7-1AF9687AAB0F}" type="datetime1">
               <a:rPr lang="ko-KR" altLang="en-US" smtClean="0"/>
-              <a:t>2019-06-21</a:t>
+              <a:t>2019-06-24</a:t>
             </a:fld>
             <a:endParaRPr lang="ko-KR" altLang="en-US"/>
           </a:p>
@@ -1295,7 +1294,7 @@
           <a:p>
             <a:fld id="{EDD93E7F-B437-40E5-8ACB-B79696783EFA}" type="datetime1">
               <a:rPr lang="ko-KR" altLang="en-US" smtClean="0"/>
-              <a:t>2019-06-21</a:t>
+              <a:t>2019-06-24</a:t>
             </a:fld>
             <a:endParaRPr lang="ko-KR" altLang="en-US"/>
           </a:p>
@@ -1539,7 +1538,7 @@
           <a:p>
             <a:fld id="{DB249950-0BD4-4F6E-BE3F-CB53B7E2FD06}" type="datetime1">
               <a:rPr lang="ko-KR" altLang="en-US" smtClean="0"/>
-              <a:t>2019-06-21</a:t>
+              <a:t>2019-06-24</a:t>
             </a:fld>
             <a:endParaRPr lang="ko-KR" altLang="en-US"/>
           </a:p>
@@ -1771,7 +1770,7 @@
           <a:p>
             <a:fld id="{7B016D7E-32C0-4DB3-B6B3-0506A62840FB}" type="datetime1">
               <a:rPr lang="ko-KR" altLang="en-US" smtClean="0"/>
-              <a:t>2019-06-21</a:t>
+              <a:t>2019-06-24</a:t>
             </a:fld>
             <a:endParaRPr lang="ko-KR" altLang="en-US"/>
           </a:p>
@@ -2138,7 +2137,7 @@
           <a:p>
             <a:fld id="{B246672D-B3FD-4B2E-92C0-4A80DA670927}" type="datetime1">
               <a:rPr lang="ko-KR" altLang="en-US" smtClean="0"/>
-              <a:t>2019-06-21</a:t>
+              <a:t>2019-06-24</a:t>
             </a:fld>
             <a:endParaRPr lang="ko-KR" altLang="en-US"/>
           </a:p>
@@ -2256,7 +2255,7 @@
           <a:p>
             <a:fld id="{9B9B7D2E-B202-4D7A-9519-0C490A04EB9C}" type="datetime1">
               <a:rPr lang="ko-KR" altLang="en-US" smtClean="0"/>
-              <a:t>2019-06-21</a:t>
+              <a:t>2019-06-24</a:t>
             </a:fld>
             <a:endParaRPr lang="ko-KR" altLang="en-US"/>
           </a:p>
@@ -2351,7 +2350,7 @@
           <a:p>
             <a:fld id="{12FB9327-987E-47D6-AE2D-63CED8A79494}" type="datetime1">
               <a:rPr lang="ko-KR" altLang="en-US" smtClean="0"/>
-              <a:t>2019-06-21</a:t>
+              <a:t>2019-06-24</a:t>
             </a:fld>
             <a:endParaRPr lang="ko-KR" altLang="en-US"/>
           </a:p>
@@ -2628,7 +2627,7 @@
           <a:p>
             <a:fld id="{D8D87011-7294-4632-A156-4F695AB9E41C}" type="datetime1">
               <a:rPr lang="ko-KR" altLang="en-US" smtClean="0"/>
-              <a:t>2019-06-21</a:t>
+              <a:t>2019-06-24</a:t>
             </a:fld>
             <a:endParaRPr lang="ko-KR" altLang="en-US"/>
           </a:p>
@@ -2885,7 +2884,7 @@
           <a:p>
             <a:fld id="{1BDC7FDB-72DE-4D65-AF4F-510496DAF70F}" type="datetime1">
               <a:rPr lang="ko-KR" altLang="en-US" smtClean="0"/>
-              <a:t>2019-06-21</a:t>
+              <a:t>2019-06-24</a:t>
             </a:fld>
             <a:endParaRPr lang="ko-KR" altLang="en-US"/>
           </a:p>
@@ -3098,7 +3097,7 @@
           <a:p>
             <a:fld id="{9A286DBF-DB43-470A-A903-26374CB6EF47}" type="datetime1">
               <a:rPr lang="ko-KR" altLang="en-US" smtClean="0"/>
-              <a:t>2019-06-21</a:t>
+              <a:t>2019-06-24</a:t>
             </a:fld>
             <a:endParaRPr lang="ko-KR" altLang="en-US"/>
           </a:p>
@@ -3521,7 +3520,7 @@
           <a:p>
             <a:fld id="{32C03489-23FC-4021-B9AB-958EFB3C0FE7}" type="datetime1">
               <a:rPr lang="ko-KR" altLang="en-US" smtClean="0"/>
-              <a:t>2019-06-21</a:t>
+              <a:t>2019-06-24</a:t>
             </a:fld>
             <a:endParaRPr lang="ko-KR" altLang="en-US"/>
           </a:p>
@@ -3596,8 +3595,8 @@
         </p:nvSpPr>
         <p:spPr>
           <a:xfrm>
-            <a:off x="5347681" y="935183"/>
-            <a:ext cx="3167669" cy="507831"/>
+            <a:off x="4937761" y="935183"/>
+            <a:ext cx="3577590" cy="507831"/>
           </a:xfrm>
           <a:prstGeom prst="rect">
             <a:avLst/>
@@ -3619,15 +3618,7 @@
             </a:pPr>
             <a:r>
               <a:rPr lang="en-US" altLang="ko-KR" dirty="0"/>
-              <a:t>S</a:t>
-            </a:r>
-            <a:r>
-              <a:rPr lang="en-US" altLang="ko-KR" dirty="0" smtClean="0"/>
-              <a:t>ymmetry </a:t>
-            </a:r>
-            <a:r>
-              <a:rPr lang="en-US" altLang="ko-KR" dirty="0"/>
-              <a:t>2D Power Splitter</a:t>
+              <a:t>2D Power Splitter with tapers</a:t>
             </a:r>
             <a:endParaRPr lang="ko-KR" altLang="en-US" dirty="0"/>
           </a:p>
@@ -3671,42 +3662,6 @@
           </a:p>
         </p:txBody>
       </p:sp>
-      <p:cxnSp>
-        <p:nvCxnSpPr>
-          <p:cNvPr id="7" name="직선 연결선 6"/>
-          <p:cNvCxnSpPr/>
-          <p:nvPr/>
-        </p:nvCxnSpPr>
-        <p:spPr>
-          <a:xfrm>
-            <a:off x="4572000" y="419793"/>
-            <a:ext cx="0" cy="6018415"/>
-          </a:xfrm>
-          <a:prstGeom prst="line">
-            <a:avLst/>
-          </a:prstGeom>
-          <a:ln w="76200">
-            <a:solidFill>
-              <a:schemeClr val="tx1"/>
-            </a:solidFill>
-            <a:prstDash val="dash"/>
-          </a:ln>
-        </p:spPr>
-        <p:style>
-          <a:lnRef idx="1">
-            <a:schemeClr val="dk1"/>
-          </a:lnRef>
-          <a:fillRef idx="0">
-            <a:schemeClr val="dk1"/>
-          </a:fillRef>
-          <a:effectRef idx="0">
-            <a:schemeClr val="dk1"/>
-          </a:effectRef>
-          <a:fontRef idx="minor">
-            <a:schemeClr val="tx1"/>
-          </a:fontRef>
-        </p:style>
-      </p:cxnSp>
       <p:sp>
         <p:nvSpPr>
           <p:cNvPr id="23" name="TextBox 22"/>
@@ -3715,7 +3670,7 @@
         </p:nvSpPr>
         <p:spPr>
           <a:xfrm>
-            <a:off x="628650" y="935183"/>
+            <a:off x="432704" y="935183"/>
             <a:ext cx="3826972" cy="507831"/>
           </a:xfrm>
           <a:prstGeom prst="rect">
@@ -3738,17 +3693,101 @@
             </a:pPr>
             <a:r>
               <a:rPr lang="en-US" altLang="ko-KR" dirty="0" smtClean="0"/>
-              <a:t>Asymmetry </a:t>
+              <a:t>2D </a:t>
             </a:r>
             <a:r>
               <a:rPr lang="en-US" altLang="ko-KR" dirty="0" smtClean="0"/>
-              <a:t>2D </a:t>
+              <a:t>Power </a:t>
             </a:r>
             <a:r>
               <a:rPr lang="en-US" altLang="ko-KR" dirty="0" smtClean="0"/>
-              <a:t>Power Splitter</a:t>
+              <a:t>Splitter with tapers</a:t>
             </a:r>
             <a:endParaRPr lang="ko-KR" altLang="en-US" dirty="0"/>
+          </a:p>
+        </p:txBody>
+      </p:sp>
+      <p:sp>
+        <p:nvSpPr>
+          <p:cNvPr id="4" name="직사각형 3"/>
+          <p:cNvSpPr/>
+          <p:nvPr/>
+        </p:nvSpPr>
+        <p:spPr>
+          <a:xfrm>
+            <a:off x="314325" y="304800"/>
+            <a:ext cx="3945351" cy="5915025"/>
+          </a:xfrm>
+          <a:prstGeom prst="rect">
+            <a:avLst/>
+          </a:prstGeom>
+          <a:noFill/>
+          <a:ln w="38100"/>
+        </p:spPr>
+        <p:style>
+          <a:lnRef idx="2">
+            <a:schemeClr val="accent1">
+              <a:shade val="50000"/>
+            </a:schemeClr>
+          </a:lnRef>
+          <a:fillRef idx="1">
+            <a:schemeClr val="accent1"/>
+          </a:fillRef>
+          <a:effectRef idx="0">
+            <a:schemeClr val="accent1"/>
+          </a:effectRef>
+          <a:fontRef idx="minor">
+            <a:schemeClr val="lt1"/>
+          </a:fontRef>
+        </p:style>
+        <p:txBody>
+          <a:bodyPr rtlCol="0" anchor="ctr"/>
+          <a:lstStyle/>
+          <a:p>
+            <a:pPr algn="ctr"/>
+            <a:endParaRPr lang="ko-KR" altLang="en-US"/>
+          </a:p>
+        </p:txBody>
+      </p:sp>
+      <p:sp>
+        <p:nvSpPr>
+          <p:cNvPr id="10" name="직사각형 9"/>
+          <p:cNvSpPr/>
+          <p:nvPr/>
+        </p:nvSpPr>
+        <p:spPr>
+          <a:xfrm>
+            <a:off x="4753880" y="304800"/>
+            <a:ext cx="3945351" cy="5915025"/>
+          </a:xfrm>
+          <a:prstGeom prst="rect">
+            <a:avLst/>
+          </a:prstGeom>
+          <a:noFill/>
+          <a:ln w="38100"/>
+        </p:spPr>
+        <p:style>
+          <a:lnRef idx="2">
+            <a:schemeClr val="accent1">
+              <a:shade val="50000"/>
+            </a:schemeClr>
+          </a:lnRef>
+          <a:fillRef idx="1">
+            <a:schemeClr val="accent1"/>
+          </a:fillRef>
+          <a:effectRef idx="0">
+            <a:schemeClr val="accent1"/>
+          </a:effectRef>
+          <a:fontRef idx="minor">
+            <a:schemeClr val="lt1"/>
+          </a:fontRef>
+        </p:style>
+        <p:txBody>
+          <a:bodyPr rtlCol="0" anchor="ctr"/>
+          <a:lstStyle/>
+          <a:p>
+            <a:pPr algn="ctr"/>
+            <a:endParaRPr lang="ko-KR" altLang="en-US"/>
           </a:p>
         </p:txBody>
       </p:sp>
@@ -3806,7 +3845,7 @@
           <a:p>
             <a:fld id="{32C03489-23FC-4021-B9AB-958EFB3C0FE7}" type="datetime1">
               <a:rPr lang="ko-KR" altLang="en-US" smtClean="0"/>
-              <a:t>2019-06-21</a:t>
+              <a:t>2019-06-24</a:t>
             </a:fld>
             <a:endParaRPr lang="ko-KR" altLang="en-US"/>
           </a:p>
@@ -4196,6 +4235,52 @@
           <a:chExt cx="0" cy="0"/>
         </a:xfrm>
       </p:grpSpPr>
+      <p:pic>
+        <p:nvPicPr>
+          <p:cNvPr id="17" name="그림 16"/>
+          <p:cNvPicPr>
+            <a:picLocks noChangeAspect="1"/>
+          </p:cNvPicPr>
+          <p:nvPr/>
+        </p:nvPicPr>
+        <p:blipFill rotWithShape="1">
+          <a:blip r:embed="rId2"/>
+          <a:srcRect l="34253" r="34607"/>
+          <a:stretch/>
+        </p:blipFill>
+        <p:spPr>
+          <a:xfrm>
+            <a:off x="2538420" y="571899"/>
+            <a:ext cx="1619250" cy="3600000"/>
+          </a:xfrm>
+          <a:prstGeom prst="rect">
+            <a:avLst/>
+          </a:prstGeom>
+        </p:spPr>
+      </p:pic>
+      <p:pic>
+        <p:nvPicPr>
+          <p:cNvPr id="18" name="그림 17"/>
+          <p:cNvPicPr>
+            <a:picLocks noChangeAspect="1"/>
+          </p:cNvPicPr>
+          <p:nvPr/>
+        </p:nvPicPr>
+        <p:blipFill rotWithShape="1">
+          <a:blip r:embed="rId3"/>
+          <a:srcRect l="34766" r="34529"/>
+          <a:stretch/>
+        </p:blipFill>
+        <p:spPr>
+          <a:xfrm>
+            <a:off x="581482" y="571899"/>
+            <a:ext cx="1600200" cy="3600000"/>
+          </a:xfrm>
+          <a:prstGeom prst="rect">
+            <a:avLst/>
+          </a:prstGeom>
+        </p:spPr>
+      </p:pic>
       <p:sp>
         <p:nvSpPr>
           <p:cNvPr id="3" name="날짜 개체 틀 2"/>
@@ -4213,7 +4298,7 @@
           <a:p>
             <a:fld id="{9B9B7D2E-B202-4D7A-9519-0C490A04EB9C}" type="datetime1">
               <a:rPr lang="ko-KR" altLang="en-US" smtClean="0"/>
-              <a:t>2019-06-21</a:t>
+              <a:t>2019-06-24</a:t>
             </a:fld>
             <a:endParaRPr lang="ko-KR" altLang="en-US"/>
           </a:p>
@@ -4270,21 +4355,361 @@
                   <a:srgbClr val="3333FF"/>
                 </a:solidFill>
               </a:rPr>
-              <a:t>2D Power </a:t>
-            </a:r>
-            <a:r>
-              <a:rPr lang="en-US" altLang="ko-KR" sz="2000" b="1" dirty="0" smtClean="0">
-                <a:solidFill>
-                  <a:srgbClr val="3333FF"/>
-                </a:solidFill>
-              </a:rPr>
-              <a:t>Splitter – FDTD Setting</a:t>
+              <a:t>2D Power Splitter – FDTD Setting</a:t>
             </a:r>
             <a:endParaRPr lang="ko-KR" altLang="en-US" sz="2000" b="1" dirty="0">
               <a:solidFill>
                 <a:srgbClr val="3333FF"/>
               </a:solidFill>
             </a:endParaRPr>
+          </a:p>
+        </p:txBody>
+      </p:sp>
+      <p:sp>
+        <p:nvSpPr>
+          <p:cNvPr id="6" name="TextBox 5"/>
+          <p:cNvSpPr txBox="1"/>
+          <p:nvPr/>
+        </p:nvSpPr>
+        <p:spPr>
+          <a:xfrm>
+            <a:off x="359929" y="4493175"/>
+            <a:ext cx="3998422" cy="1477328"/>
+          </a:xfrm>
+          <a:prstGeom prst="rect">
+            <a:avLst/>
+          </a:prstGeom>
+          <a:noFill/>
+        </p:spPr>
+        <p:txBody>
+          <a:bodyPr wrap="square" rtlCol="0">
+            <a:spAutoFit/>
+          </a:bodyPr>
+          <a:lstStyle/>
+          <a:p>
+            <a:pPr marL="285750" indent="-285750">
+              <a:buFontTx/>
+              <a:buChar char="-"/>
+            </a:pPr>
+            <a:r>
+              <a:rPr lang="en-US" altLang="ko-KR" dirty="0" smtClean="0"/>
+              <a:t>Simulation region: 250 ~ 350 um</a:t>
+            </a:r>
+          </a:p>
+          <a:p>
+            <a:pPr marL="285750" indent="-285750">
+              <a:buFontTx/>
+              <a:buChar char="-"/>
+            </a:pPr>
+            <a:r>
+              <a:rPr lang="en-US" altLang="ko-KR" dirty="0" smtClean="0"/>
+              <a:t>Waveguide thickness: 100 um</a:t>
+            </a:r>
+          </a:p>
+          <a:p>
+            <a:pPr marL="285750" indent="-285750">
+              <a:buFontTx/>
+              <a:buChar char="-"/>
+            </a:pPr>
+            <a:r>
+              <a:rPr lang="en-US" altLang="ko-KR" dirty="0" smtClean="0"/>
+              <a:t>Square: 500 um x 500 um</a:t>
+            </a:r>
+          </a:p>
+          <a:p>
+            <a:pPr marL="285750" indent="-285750">
+              <a:buFontTx/>
+              <a:buChar char="-"/>
+            </a:pPr>
+            <a:r>
+              <a:rPr lang="en-US" altLang="ko-KR" dirty="0" smtClean="0"/>
+              <a:t>Taper connection: 250 um</a:t>
+            </a:r>
+          </a:p>
+          <a:p>
+            <a:pPr marL="285750" indent="-285750">
+              <a:buFontTx/>
+              <a:buChar char="-"/>
+            </a:pPr>
+            <a:r>
+              <a:rPr lang="en-US" altLang="ko-KR" dirty="0" smtClean="0"/>
+              <a:t>Holes: 20x20 with a radius of 9 um</a:t>
+            </a:r>
+            <a:endParaRPr lang="ko-KR" altLang="en-US" dirty="0"/>
+          </a:p>
+        </p:txBody>
+      </p:sp>
+      <p:pic>
+        <p:nvPicPr>
+          <p:cNvPr id="9" name="그림 8"/>
+          <p:cNvPicPr>
+            <a:picLocks noChangeAspect="1"/>
+          </p:cNvPicPr>
+          <p:nvPr/>
+        </p:nvPicPr>
+        <p:blipFill>
+          <a:blip r:embed="rId4">
+            <a:extLst>
+              <a:ext uri="{28A0092B-C50C-407E-A947-70E740481C1C}">
+                <a14:useLocalDpi xmlns:a14="http://schemas.microsoft.com/office/drawing/2010/main" val="0"/>
+              </a:ext>
+            </a:extLst>
+          </a:blip>
+          <a:stretch>
+            <a:fillRect/>
+          </a:stretch>
+        </p:blipFill>
+        <p:spPr>
+          <a:xfrm>
+            <a:off x="4759190" y="418350"/>
+            <a:ext cx="3600000" cy="2239862"/>
+          </a:xfrm>
+          <a:prstGeom prst="rect">
+            <a:avLst/>
+          </a:prstGeom>
+        </p:spPr>
+      </p:pic>
+      <p:pic>
+        <p:nvPicPr>
+          <p:cNvPr id="10" name="그림 9"/>
+          <p:cNvPicPr>
+            <a:picLocks noChangeAspect="1"/>
+          </p:cNvPicPr>
+          <p:nvPr/>
+        </p:nvPicPr>
+        <p:blipFill>
+          <a:blip r:embed="rId5">
+            <a:extLst>
+              <a:ext uri="{28A0092B-C50C-407E-A947-70E740481C1C}">
+                <a14:useLocalDpi xmlns:a14="http://schemas.microsoft.com/office/drawing/2010/main" val="0"/>
+              </a:ext>
+            </a:extLst>
+          </a:blip>
+          <a:stretch>
+            <a:fillRect/>
+          </a:stretch>
+        </p:blipFill>
+        <p:spPr>
+          <a:xfrm>
+            <a:off x="4759190" y="2658212"/>
+            <a:ext cx="3600000" cy="2239861"/>
+          </a:xfrm>
+          <a:prstGeom prst="rect">
+            <a:avLst/>
+          </a:prstGeom>
+        </p:spPr>
+      </p:pic>
+      <p:sp>
+        <p:nvSpPr>
+          <p:cNvPr id="11" name="TextBox 10"/>
+          <p:cNvSpPr txBox="1"/>
+          <p:nvPr/>
+        </p:nvSpPr>
+        <p:spPr>
+          <a:xfrm>
+            <a:off x="552330" y="517206"/>
+            <a:ext cx="626038" cy="369332"/>
+          </a:xfrm>
+          <a:prstGeom prst="rect">
+            <a:avLst/>
+          </a:prstGeom>
+          <a:noFill/>
+        </p:spPr>
+        <p:txBody>
+          <a:bodyPr wrap="square" rtlCol="0">
+            <a:spAutoFit/>
+          </a:bodyPr>
+          <a:lstStyle/>
+          <a:p>
+            <a:r>
+              <a:rPr lang="en-US" altLang="ko-KR" dirty="0" smtClean="0">
+                <a:solidFill>
+                  <a:schemeClr val="bg1"/>
+                </a:solidFill>
+              </a:rPr>
+              <a:t>(a)-1</a:t>
+            </a:r>
+            <a:endParaRPr lang="ko-KR" altLang="en-US" dirty="0">
+              <a:solidFill>
+                <a:schemeClr val="bg1"/>
+              </a:solidFill>
+            </a:endParaRPr>
+          </a:p>
+        </p:txBody>
+      </p:sp>
+      <p:sp>
+        <p:nvSpPr>
+          <p:cNvPr id="12" name="TextBox 11"/>
+          <p:cNvSpPr txBox="1"/>
+          <p:nvPr/>
+        </p:nvSpPr>
+        <p:spPr>
+          <a:xfrm>
+            <a:off x="2538420" y="517206"/>
+            <a:ext cx="626038" cy="369332"/>
+          </a:xfrm>
+          <a:prstGeom prst="rect">
+            <a:avLst/>
+          </a:prstGeom>
+          <a:noFill/>
+        </p:spPr>
+        <p:txBody>
+          <a:bodyPr wrap="square" rtlCol="0">
+            <a:spAutoFit/>
+          </a:bodyPr>
+          <a:lstStyle/>
+          <a:p>
+            <a:r>
+              <a:rPr lang="en-US" altLang="ko-KR" dirty="0" smtClean="0">
+                <a:solidFill>
+                  <a:schemeClr val="bg1"/>
+                </a:solidFill>
+              </a:rPr>
+              <a:t>(a)-2</a:t>
+            </a:r>
+            <a:endParaRPr lang="ko-KR" altLang="en-US" dirty="0">
+              <a:solidFill>
+                <a:schemeClr val="bg1"/>
+              </a:solidFill>
+            </a:endParaRPr>
+          </a:p>
+        </p:txBody>
+      </p:sp>
+      <p:sp>
+        <p:nvSpPr>
+          <p:cNvPr id="13" name="TextBox 12"/>
+          <p:cNvSpPr txBox="1"/>
+          <p:nvPr/>
+        </p:nvSpPr>
+        <p:spPr>
+          <a:xfrm>
+            <a:off x="4962404" y="373895"/>
+            <a:ext cx="695445" cy="369332"/>
+          </a:xfrm>
+          <a:prstGeom prst="rect">
+            <a:avLst/>
+          </a:prstGeom>
+          <a:noFill/>
+        </p:spPr>
+        <p:txBody>
+          <a:bodyPr wrap="square" rtlCol="0">
+            <a:spAutoFit/>
+          </a:bodyPr>
+          <a:lstStyle/>
+          <a:p>
+            <a:r>
+              <a:rPr lang="en-US" altLang="ko-KR" dirty="0" smtClean="0"/>
+              <a:t>(b)-1</a:t>
+            </a:r>
+            <a:endParaRPr lang="ko-KR" altLang="en-US" dirty="0"/>
+          </a:p>
+        </p:txBody>
+      </p:sp>
+      <p:sp>
+        <p:nvSpPr>
+          <p:cNvPr id="14" name="TextBox 13"/>
+          <p:cNvSpPr txBox="1"/>
+          <p:nvPr/>
+        </p:nvSpPr>
+        <p:spPr>
+          <a:xfrm>
+            <a:off x="4962405" y="2689329"/>
+            <a:ext cx="695444" cy="369332"/>
+          </a:xfrm>
+          <a:prstGeom prst="rect">
+            <a:avLst/>
+          </a:prstGeom>
+          <a:noFill/>
+        </p:spPr>
+        <p:txBody>
+          <a:bodyPr wrap="square" rtlCol="0">
+            <a:spAutoFit/>
+          </a:bodyPr>
+          <a:lstStyle/>
+          <a:p>
+            <a:r>
+              <a:rPr lang="en-US" altLang="ko-KR" dirty="0" smtClean="0"/>
+              <a:t>(b)-2</a:t>
+            </a:r>
+            <a:endParaRPr lang="ko-KR" altLang="en-US" dirty="0"/>
+          </a:p>
+        </p:txBody>
+      </p:sp>
+      <p:sp>
+        <p:nvSpPr>
+          <p:cNvPr id="15" name="TextBox 14"/>
+          <p:cNvSpPr txBox="1"/>
+          <p:nvPr/>
+        </p:nvSpPr>
+        <p:spPr>
+          <a:xfrm>
+            <a:off x="6129990" y="202567"/>
+            <a:ext cx="1296463" cy="369332"/>
+          </a:xfrm>
+          <a:prstGeom prst="rect">
+            <a:avLst/>
+          </a:prstGeom>
+          <a:noFill/>
+        </p:spPr>
+        <p:txBody>
+          <a:bodyPr wrap="square" rtlCol="0">
+            <a:spAutoFit/>
+          </a:bodyPr>
+          <a:lstStyle/>
+          <a:p>
+            <a:r>
+              <a:rPr lang="en-US" altLang="ko-KR" dirty="0" smtClean="0"/>
+              <a:t>Output 1&amp;2</a:t>
+            </a:r>
+            <a:endParaRPr lang="ko-KR" altLang="en-US" dirty="0"/>
+          </a:p>
+        </p:txBody>
+      </p:sp>
+      <p:sp>
+        <p:nvSpPr>
+          <p:cNvPr id="16" name="위쪽 화살표 15"/>
+          <p:cNvSpPr/>
+          <p:nvPr/>
+        </p:nvSpPr>
+        <p:spPr>
+          <a:xfrm>
+            <a:off x="2216325" y="645279"/>
+            <a:ext cx="285630" cy="3383813"/>
+          </a:xfrm>
+          <a:prstGeom prst="upArrow">
+            <a:avLst/>
+          </a:prstGeom>
+          <a:solidFill>
+            <a:srgbClr val="FFFF00"/>
+          </a:solidFill>
+          <a:ln w="19050">
+            <a:solidFill>
+              <a:schemeClr val="tx1"/>
+            </a:solidFill>
+          </a:ln>
+        </p:spPr>
+        <p:style>
+          <a:lnRef idx="2">
+            <a:schemeClr val="accent1">
+              <a:shade val="50000"/>
+            </a:schemeClr>
+          </a:lnRef>
+          <a:fillRef idx="1">
+            <a:schemeClr val="accent1"/>
+          </a:fillRef>
+          <a:effectRef idx="0">
+            <a:schemeClr val="accent1"/>
+          </a:effectRef>
+          <a:fontRef idx="minor">
+            <a:schemeClr val="lt1"/>
+          </a:fontRef>
+        </p:style>
+        <p:txBody>
+          <a:bodyPr rtlCol="0" anchor="ctr"/>
+          <a:lstStyle/>
+          <a:p>
+            <a:pPr algn="ctr"/>
+            <a:endParaRPr lang="ko-KR" altLang="en-US"/>
           </a:p>
         </p:txBody>
       </p:sp>
@@ -4298,6 +4723,13 @@
   <p:clrMapOvr>
     <a:masterClrMapping/>
   </p:clrMapOvr>
+  <p:timing>
+    <p:tnLst>
+      <p:par>
+        <p:cTn id="1" dur="indefinite" restart="never" nodeType="tmRoot"/>
+      </p:par>
+    </p:tnLst>
+  </p:timing>
 </p:sld>
 </file>
 
@@ -4369,15 +4801,7 @@
                   <a:srgbClr val="3333FF"/>
                 </a:solidFill>
               </a:rPr>
-              <a:t>2D Power </a:t>
-            </a:r>
-            <a:r>
-              <a:rPr lang="en-US" altLang="ko-KR" sz="2000" b="1" dirty="0" smtClean="0">
-                <a:solidFill>
-                  <a:srgbClr val="3333FF"/>
-                </a:solidFill>
-              </a:rPr>
-              <a:t>Splitter – Machine Learning Setting</a:t>
+              <a:t>2D Power Splitter – Machine Learning Setting</a:t>
             </a:r>
             <a:endParaRPr lang="ko-KR" altLang="en-US" sz="2000" b="1" dirty="0">
               <a:solidFill>
@@ -5180,8 +5604,8 @@
           </a:fontRef>
         </p:style>
       </p:cxnSp>
-      <mc:AlternateContent xmlns:mc="http://schemas.openxmlformats.org/markup-compatibility/2006">
-        <mc:Choice xmlns:a14="http://schemas.microsoft.com/office/drawing/2010/main" Requires="a14">
+      <mc:AlternateContent xmlns:mc="http://schemas.openxmlformats.org/markup-compatibility/2006" xmlns:a14="http://schemas.microsoft.com/office/drawing/2010/main">
+        <mc:Choice Requires="a14">
           <p:sp>
             <p:nvSpPr>
               <p:cNvPr id="37" name="TextBox 36"/>
@@ -5283,7 +5707,7 @@
             </p:txBody>
           </p:sp>
         </mc:Choice>
-        <mc:Fallback>
+        <mc:Fallback xmlns="">
           <p:sp>
             <p:nvSpPr>
               <p:cNvPr id="37" name="TextBox 36"/>
@@ -5382,8 +5806,8 @@
           </a:p>
         </p:txBody>
       </p:sp>
-      <mc:AlternateContent xmlns:mc="http://schemas.openxmlformats.org/markup-compatibility/2006">
-        <mc:Choice xmlns:a14="http://schemas.microsoft.com/office/drawing/2010/main" Requires="a14">
+      <mc:AlternateContent xmlns:mc="http://schemas.openxmlformats.org/markup-compatibility/2006" xmlns:a14="http://schemas.microsoft.com/office/drawing/2010/main">
+        <mc:Choice Requires="a14">
           <p:sp>
             <p:nvSpPr>
               <p:cNvPr id="41" name="직사각형 40"/>
@@ -5520,7 +5944,7 @@
             </p:txBody>
           </p:sp>
         </mc:Choice>
-        <mc:Fallback>
+        <mc:Fallback xmlns="">
           <p:sp>
             <p:nvSpPr>
               <p:cNvPr id="41" name="직사각형 40"/>
@@ -5569,157 +5993,13 @@
   <p:clrMapOvr>
     <a:masterClrMapping/>
   </p:clrMapOvr>
-</p:sld>
-</file>
-
-<file path=ppt/slides/slide5.xml><?xml version="1.0" encoding="utf-8"?>
-<p:sld xmlns:a="http://schemas.openxmlformats.org/drawingml/2006/main" xmlns:r="http://schemas.openxmlformats.org/officeDocument/2006/relationships" xmlns:p="http://schemas.openxmlformats.org/presentationml/2006/main">
-  <p:cSld>
-    <p:spTree>
-      <p:nvGrpSpPr>
-        <p:cNvPr id="1" name=""/>
-        <p:cNvGrpSpPr/>
-        <p:nvPr/>
-      </p:nvGrpSpPr>
-      <p:grpSpPr>
-        <a:xfrm>
-          <a:off x="0" y="0"/>
-          <a:ext cx="0" cy="0"/>
-          <a:chOff x="0" y="0"/>
-          <a:chExt cx="0" cy="0"/>
-        </a:xfrm>
-      </p:grpSpPr>
-      <p:sp>
-        <p:nvSpPr>
-          <p:cNvPr id="3" name="날짜 개체 틀 2"/>
-          <p:cNvSpPr>
-            <a:spLocks noGrp="1"/>
-          </p:cNvSpPr>
-          <p:nvPr>
-            <p:ph type="dt" sz="half" idx="10"/>
-          </p:nvPr>
-        </p:nvSpPr>
-        <p:spPr/>
-        <p:txBody>
-          <a:bodyPr/>
-          <a:lstStyle/>
-          <a:p>
-            <a:fld id="{9B9B7D2E-B202-4D7A-9519-0C490A04EB9C}" type="datetime1">
-              <a:rPr lang="ko-KR" altLang="en-US" smtClean="0"/>
-              <a:t>2019-06-21</a:t>
-            </a:fld>
-            <a:endParaRPr lang="ko-KR" altLang="en-US"/>
-          </a:p>
-        </p:txBody>
-      </p:sp>
-      <p:sp>
-        <p:nvSpPr>
-          <p:cNvPr id="4" name="슬라이드 번호 개체 틀 3"/>
-          <p:cNvSpPr>
-            <a:spLocks noGrp="1"/>
-          </p:cNvSpPr>
-          <p:nvPr>
-            <p:ph type="sldNum" sz="quarter" idx="12"/>
-          </p:nvPr>
-        </p:nvSpPr>
-        <p:spPr/>
-        <p:txBody>
-          <a:bodyPr/>
-          <a:lstStyle/>
-          <a:p>
-            <a:fld id="{8765F8EB-1186-4395-8E70-F957669279DD}" type="slidenum">
-              <a:rPr lang="ko-KR" altLang="en-US" smtClean="0"/>
-              <a:t>5</a:t>
-            </a:fld>
-            <a:endParaRPr lang="ko-KR" altLang="en-US"/>
-          </a:p>
-        </p:txBody>
-      </p:sp>
-      <p:sp>
-        <p:nvSpPr>
-          <p:cNvPr id="5" name="TextBox 4"/>
-          <p:cNvSpPr txBox="1"/>
-          <p:nvPr/>
-        </p:nvSpPr>
-        <p:spPr>
-          <a:xfrm>
-            <a:off x="0" y="2512"/>
-            <a:ext cx="2850845" cy="400110"/>
-          </a:xfrm>
-          <a:prstGeom prst="rect">
-            <a:avLst/>
-          </a:prstGeom>
-          <a:noFill/>
-        </p:spPr>
-        <p:txBody>
-          <a:bodyPr wrap="none" rtlCol="0">
-            <a:spAutoFit/>
-          </a:bodyPr>
-          <a:lstStyle/>
-          <a:p>
-            <a:r>
-              <a:rPr lang="en-US" altLang="ko-KR" sz="2000" b="1" dirty="0" smtClean="0">
-                <a:solidFill>
-                  <a:srgbClr val="3333FF"/>
-                </a:solidFill>
-              </a:rPr>
-              <a:t>2D Power </a:t>
-            </a:r>
-            <a:r>
-              <a:rPr lang="en-US" altLang="ko-KR" sz="2000" b="1" dirty="0" smtClean="0">
-                <a:solidFill>
-                  <a:srgbClr val="3333FF"/>
-                </a:solidFill>
-              </a:rPr>
-              <a:t>Splitter - result</a:t>
-            </a:r>
-            <a:endParaRPr lang="ko-KR" altLang="en-US" sz="2000" b="1" dirty="0">
-              <a:solidFill>
-                <a:srgbClr val="3333FF"/>
-              </a:solidFill>
-            </a:endParaRPr>
-          </a:p>
-        </p:txBody>
-      </p:sp>
-      <p:pic>
-        <p:nvPicPr>
-          <p:cNvPr id="6" name="그림 5"/>
-          <p:cNvPicPr>
-            <a:picLocks noChangeAspect="1"/>
-          </p:cNvPicPr>
-          <p:nvPr/>
-        </p:nvPicPr>
-        <p:blipFill rotWithShape="1">
-          <a:blip r:embed="rId2">
-            <a:extLst>
-              <a:ext uri="{28A0092B-C50C-407E-A947-70E740481C1C}">
-                <a14:useLocalDpi xmlns:a14="http://schemas.microsoft.com/office/drawing/2010/main" val="0"/>
-              </a:ext>
-            </a:extLst>
-          </a:blip>
-          <a:srcRect l="15341" t="10134" r="19034" b="5776"/>
-          <a:stretch/>
-        </p:blipFill>
-        <p:spPr>
-          <a:xfrm>
-            <a:off x="1176672" y="897776"/>
-            <a:ext cx="3018756" cy="2901142"/>
-          </a:xfrm>
-          <a:prstGeom prst="rect">
-            <a:avLst/>
-          </a:prstGeom>
-        </p:spPr>
-      </p:pic>
-    </p:spTree>
-    <p:extLst>
-      <p:ext uri="{BB962C8B-B14F-4D97-AF65-F5344CB8AC3E}">
-        <p14:creationId xmlns:p14="http://schemas.microsoft.com/office/powerpoint/2010/main" val="545648102"/>
-      </p:ext>
-    </p:extLst>
-  </p:cSld>
-  <p:clrMapOvr>
-    <a:masterClrMapping/>
-  </p:clrMapOvr>
+  <p:timing>
+    <p:tnLst>
+      <p:par>
+        <p:cTn id="1" dur="indefinite" restart="never" nodeType="tmRoot"/>
+      </p:par>
+    </p:tnLst>
+  </p:timing>
 </p:sld>
 </file>
 

</xml_diff>